<commit_message>
Entrega da apresentação do Particle Swarm Optimization
</commit_message>
<xml_diff>
--- a/versao04/PSO.pptx
+++ b/versao04/PSO.pptx
@@ -13,7 +13,13 @@
     <p:sldId id="261" r:id="rId7"/>
     <p:sldId id="262" r:id="rId8"/>
     <p:sldId id="263" r:id="rId9"/>
-    <p:sldId id="264" r:id="rId10"/>
+    <p:sldId id="265" r:id="rId10"/>
+    <p:sldId id="266" r:id="rId11"/>
+    <p:sldId id="267" r:id="rId12"/>
+    <p:sldId id="270" r:id="rId13"/>
+    <p:sldId id="268" r:id="rId14"/>
+    <p:sldId id="269" r:id="rId15"/>
+    <p:sldId id="264" r:id="rId16"/>
   </p:sldIdLst>
   <p:sldSz cx="9144000" cy="6858000" type="screen4x3"/>
   <p:notesSz cx="6858000" cy="9144000"/>
@@ -258,6 +264,7 @@
           <a:p>
             <a:fld id="{742A9769-75A8-4409-BD6A-4B6605DD7948}" type="datetimeFigureOut">
               <a:rPr lang="pt-PT" smtClean="0"/>
+              <a:pPr/>
               <a:t>24-05-2012</a:t>
             </a:fld>
             <a:endParaRPr lang="pt-PT"/>
@@ -310,6 +317,7 @@
           <a:p>
             <a:fld id="{E1B05A78-9EAC-4D97-8F69-401C89F85555}" type="slidenum">
               <a:rPr lang="pt-PT" smtClean="0"/>
+              <a:pPr/>
               <a:t>‹nº›</a:t>
             </a:fld>
             <a:endParaRPr lang="pt-PT"/>
@@ -617,6 +625,7 @@
           <a:p>
             <a:fld id="{742A9769-75A8-4409-BD6A-4B6605DD7948}" type="datetimeFigureOut">
               <a:rPr lang="pt-PT" smtClean="0"/>
+              <a:pPr/>
               <a:t>24-05-2012</a:t>
             </a:fld>
             <a:endParaRPr lang="pt-PT"/>
@@ -659,6 +668,7 @@
           <a:p>
             <a:fld id="{E1B05A78-9EAC-4D97-8F69-401C89F85555}" type="slidenum">
               <a:rPr lang="pt-PT" smtClean="0"/>
+              <a:pPr/>
               <a:t>‹nº›</a:t>
             </a:fld>
             <a:endParaRPr lang="pt-PT"/>
@@ -792,6 +802,7 @@
           <a:p>
             <a:fld id="{742A9769-75A8-4409-BD6A-4B6605DD7948}" type="datetimeFigureOut">
               <a:rPr lang="pt-PT" smtClean="0"/>
+              <a:pPr/>
               <a:t>24-05-2012</a:t>
             </a:fld>
             <a:endParaRPr lang="pt-PT"/>
@@ -834,6 +845,7 @@
           <a:p>
             <a:fld id="{E1B05A78-9EAC-4D97-8F69-401C89F85555}" type="slidenum">
               <a:rPr lang="pt-PT" smtClean="0"/>
+              <a:pPr/>
               <a:t>‹nº›</a:t>
             </a:fld>
             <a:endParaRPr lang="pt-PT"/>
@@ -1027,6 +1039,7 @@
           <a:p>
             <a:fld id="{742A9769-75A8-4409-BD6A-4B6605DD7948}" type="datetimeFigureOut">
               <a:rPr lang="pt-PT" smtClean="0"/>
+              <a:pPr/>
               <a:t>24-05-2012</a:t>
             </a:fld>
             <a:endParaRPr lang="pt-PT"/>
@@ -1069,6 +1082,7 @@
           <a:p>
             <a:fld id="{E1B05A78-9EAC-4D97-8F69-401C89F85555}" type="slidenum">
               <a:rPr lang="pt-PT" smtClean="0"/>
+              <a:pPr/>
               <a:t>‹nº›</a:t>
             </a:fld>
             <a:endParaRPr lang="pt-PT"/>
@@ -1296,6 +1310,7 @@
           <a:p>
             <a:fld id="{742A9769-75A8-4409-BD6A-4B6605DD7948}" type="datetimeFigureOut">
               <a:rPr lang="pt-PT" smtClean="0"/>
+              <a:pPr/>
               <a:t>24-05-2012</a:t>
             </a:fld>
             <a:endParaRPr lang="pt-PT"/>
@@ -1348,6 +1363,7 @@
           <a:p>
             <a:fld id="{E1B05A78-9EAC-4D97-8F69-401C89F85555}" type="slidenum">
               <a:rPr lang="pt-PT" smtClean="0"/>
+              <a:pPr/>
               <a:t>‹nº›</a:t>
             </a:fld>
             <a:endParaRPr lang="pt-PT"/>
@@ -1516,6 +1532,7 @@
           <a:p>
             <a:fld id="{742A9769-75A8-4409-BD6A-4B6605DD7948}" type="datetimeFigureOut">
               <a:rPr lang="pt-PT" smtClean="0"/>
+              <a:pPr/>
               <a:t>24-05-2012</a:t>
             </a:fld>
             <a:endParaRPr lang="pt-PT"/>
@@ -1558,6 +1575,7 @@
           <a:p>
             <a:fld id="{E1B05A78-9EAC-4D97-8F69-401C89F85555}" type="slidenum">
               <a:rPr lang="pt-PT" smtClean="0"/>
+              <a:pPr/>
               <a:t>‹nº›</a:t>
             </a:fld>
             <a:endParaRPr lang="pt-PT"/>
@@ -1868,6 +1886,7 @@
           <a:p>
             <a:fld id="{742A9769-75A8-4409-BD6A-4B6605DD7948}" type="datetimeFigureOut">
               <a:rPr lang="pt-PT" smtClean="0"/>
+              <a:pPr/>
               <a:t>24-05-2012</a:t>
             </a:fld>
             <a:endParaRPr lang="pt-PT"/>
@@ -1910,6 +1929,7 @@
           <a:p>
             <a:fld id="{E1B05A78-9EAC-4D97-8F69-401C89F85555}" type="slidenum">
               <a:rPr lang="pt-PT" smtClean="0"/>
+              <a:pPr/>
               <a:t>‹nº›</a:t>
             </a:fld>
             <a:endParaRPr lang="pt-PT"/>
@@ -2100,6 +2120,7 @@
           <a:p>
             <a:fld id="{742A9769-75A8-4409-BD6A-4B6605DD7948}" type="datetimeFigureOut">
               <a:rPr lang="pt-PT" smtClean="0"/>
+              <a:pPr/>
               <a:t>24-05-2012</a:t>
             </a:fld>
             <a:endParaRPr lang="pt-PT"/>
@@ -2142,6 +2163,7 @@
           <a:p>
             <a:fld id="{E1B05A78-9EAC-4D97-8F69-401C89F85555}" type="slidenum">
               <a:rPr lang="pt-PT" smtClean="0"/>
+              <a:pPr/>
               <a:t>‹nº›</a:t>
             </a:fld>
             <a:endParaRPr lang="pt-PT"/>
@@ -2240,6 +2262,7 @@
           <a:p>
             <a:fld id="{742A9769-75A8-4409-BD6A-4B6605DD7948}" type="datetimeFigureOut">
               <a:rPr lang="pt-PT" smtClean="0"/>
+              <a:pPr/>
               <a:t>24-05-2012</a:t>
             </a:fld>
             <a:endParaRPr lang="pt-PT"/>
@@ -2282,6 +2305,7 @@
           <a:p>
             <a:fld id="{E1B05A78-9EAC-4D97-8F69-401C89F85555}" type="slidenum">
               <a:rPr lang="pt-PT" smtClean="0"/>
+              <a:pPr/>
               <a:t>‹nº›</a:t>
             </a:fld>
             <a:endParaRPr lang="pt-PT"/>
@@ -2517,6 +2541,7 @@
           <a:p>
             <a:fld id="{742A9769-75A8-4409-BD6A-4B6605DD7948}" type="datetimeFigureOut">
               <a:rPr lang="pt-PT" smtClean="0"/>
+              <a:pPr/>
               <a:t>24-05-2012</a:t>
             </a:fld>
             <a:endParaRPr lang="pt-PT"/>
@@ -2559,6 +2584,7 @@
           <a:p>
             <a:fld id="{E1B05A78-9EAC-4D97-8F69-401C89F85555}" type="slidenum">
               <a:rPr lang="pt-PT" smtClean="0"/>
+              <a:pPr/>
               <a:t>‹nº›</a:t>
             </a:fld>
             <a:endParaRPr lang="pt-PT"/>
@@ -2924,6 +2950,7 @@
           <a:p>
             <a:fld id="{742A9769-75A8-4409-BD6A-4B6605DD7948}" type="datetimeFigureOut">
               <a:rPr lang="pt-PT" smtClean="0"/>
+              <a:pPr/>
               <a:t>24-05-2012</a:t>
             </a:fld>
             <a:endParaRPr lang="pt-PT"/>
@@ -2966,6 +2993,7 @@
           <a:p>
             <a:fld id="{E1B05A78-9EAC-4D97-8F69-401C89F85555}" type="slidenum">
               <a:rPr lang="pt-PT" smtClean="0"/>
+              <a:pPr/>
               <a:t>‹nº›</a:t>
             </a:fld>
             <a:endParaRPr lang="pt-PT"/>
@@ -3262,6 +3290,7 @@
           <a:p>
             <a:fld id="{742A9769-75A8-4409-BD6A-4B6605DD7948}" type="datetimeFigureOut">
               <a:rPr lang="pt-PT" smtClean="0"/>
+              <a:pPr/>
               <a:t>24-05-2012</a:t>
             </a:fld>
             <a:endParaRPr lang="pt-PT"/>
@@ -3336,6 +3365,7 @@
           <a:p>
             <a:fld id="{E1B05A78-9EAC-4D97-8F69-401C89F85555}" type="slidenum">
               <a:rPr lang="pt-PT" smtClean="0"/>
+              <a:pPr/>
               <a:t>‹nº›</a:t>
             </a:fld>
             <a:endParaRPr lang="pt-PT"/>
@@ -3901,6 +3931,1267 @@
 </p:sld>
 </file>
 
+<file path=ppt/slides/slide10.xml><?xml version="1.0" encoding="utf-8"?>
+<p:sld xmlns:a="http://schemas.openxmlformats.org/drawingml/2006/main" xmlns:r="http://schemas.openxmlformats.org/officeDocument/2006/relationships" xmlns:p="http://schemas.openxmlformats.org/presentationml/2006/main">
+  <p:cSld>
+    <p:spTree>
+      <p:nvGrpSpPr>
+        <p:cNvPr id="1" name=""/>
+        <p:cNvGrpSpPr/>
+        <p:nvPr/>
+      </p:nvGrpSpPr>
+      <p:grpSpPr>
+        <a:xfrm>
+          <a:off x="0" y="0"/>
+          <a:ext cx="0" cy="0"/>
+          <a:chOff x="0" y="0"/>
+          <a:chExt cx="0" cy="0"/>
+        </a:xfrm>
+      </p:grpSpPr>
+      <p:sp>
+        <p:nvSpPr>
+          <p:cNvPr id="2" name="Título 1"/>
+          <p:cNvSpPr>
+            <a:spLocks noGrp="1"/>
+          </p:cNvSpPr>
+          <p:nvPr>
+            <p:ph type="title"/>
+          </p:nvPr>
+        </p:nvSpPr>
+        <p:spPr/>
+        <p:txBody>
+          <a:bodyPr/>
+          <a:lstStyle/>
+          <a:p>
+            <a:r>
+              <a:rPr lang="pt-PT" dirty="0" err="1" smtClean="0">
+                <a:solidFill>
+                  <a:srgbClr val="0070C0"/>
+                </a:solidFill>
+              </a:rPr>
+              <a:t>Particle</a:t>
+            </a:r>
+            <a:r>
+              <a:rPr lang="pt-PT" dirty="0" smtClean="0">
+                <a:solidFill>
+                  <a:srgbClr val="0070C0"/>
+                </a:solidFill>
+              </a:rPr>
+              <a:t> </a:t>
+            </a:r>
+            <a:r>
+              <a:rPr lang="pt-PT" dirty="0" err="1" smtClean="0">
+                <a:solidFill>
+                  <a:srgbClr val="0070C0"/>
+                </a:solidFill>
+              </a:rPr>
+              <a:t>Swarm</a:t>
+            </a:r>
+            <a:r>
+              <a:rPr lang="pt-PT" dirty="0" smtClean="0">
+                <a:solidFill>
+                  <a:srgbClr val="0070C0"/>
+                </a:solidFill>
+              </a:rPr>
+              <a:t> </a:t>
+            </a:r>
+            <a:r>
+              <a:rPr lang="pt-PT" dirty="0" err="1" smtClean="0">
+                <a:solidFill>
+                  <a:srgbClr val="0070C0"/>
+                </a:solidFill>
+              </a:rPr>
+              <a:t>Optimization</a:t>
+            </a:r>
+            <a:r>
+              <a:rPr lang="pt-PT" dirty="0" smtClean="0">
+                <a:solidFill>
+                  <a:srgbClr val="0070C0"/>
+                </a:solidFill>
+              </a:rPr>
+              <a:t> - exemplo</a:t>
+            </a:r>
+            <a:endParaRPr lang="pt-PT" dirty="0"/>
+          </a:p>
+        </p:txBody>
+      </p:sp>
+      <p:pic>
+        <p:nvPicPr>
+          <p:cNvPr id="4" name="Marcador de Posição de Conteúdo 3" descr="PSO2.jpg"/>
+          <p:cNvPicPr>
+            <a:picLocks noGrp="1" noChangeAspect="1"/>
+          </p:cNvPicPr>
+          <p:nvPr>
+            <p:ph sz="quarter" idx="1"/>
+          </p:nvPr>
+        </p:nvPicPr>
+        <p:blipFill>
+          <a:blip r:embed="rId2" cstate="print"/>
+          <a:stretch>
+            <a:fillRect/>
+          </a:stretch>
+        </p:blipFill>
+        <p:spPr>
+          <a:xfrm>
+            <a:off x="2286000" y="2120900"/>
+            <a:ext cx="4572000" cy="3133725"/>
+          </a:xfrm>
+        </p:spPr>
+      </p:pic>
+      <p:pic>
+        <p:nvPicPr>
+          <p:cNvPr id="2050" name="Picture 2"/>
+          <p:cNvPicPr>
+            <a:picLocks noChangeAspect="1" noChangeArrowheads="1"/>
+          </p:cNvPicPr>
+          <p:nvPr/>
+        </p:nvPicPr>
+        <p:blipFill>
+          <a:blip r:embed="rId3" cstate="print"/>
+          <a:srcRect/>
+          <a:stretch>
+            <a:fillRect/>
+          </a:stretch>
+        </p:blipFill>
+        <p:spPr bwMode="auto">
+          <a:xfrm>
+            <a:off x="4139952" y="3573016"/>
+            <a:ext cx="266700" cy="266700"/>
+          </a:xfrm>
+          <a:prstGeom prst="rect">
+            <a:avLst/>
+          </a:prstGeom>
+          <a:noFill/>
+          <a:ln w="9525">
+            <a:noFill/>
+            <a:miter lim="800000"/>
+            <a:headEnd/>
+            <a:tailEnd/>
+          </a:ln>
+        </p:spPr>
+      </p:pic>
+      <p:pic>
+        <p:nvPicPr>
+          <p:cNvPr id="2051" name="Picture 3"/>
+          <p:cNvPicPr>
+            <a:picLocks noChangeAspect="1" noChangeArrowheads="1"/>
+          </p:cNvPicPr>
+          <p:nvPr/>
+        </p:nvPicPr>
+        <p:blipFill>
+          <a:blip r:embed="rId4" cstate="print"/>
+          <a:srcRect/>
+          <a:stretch>
+            <a:fillRect/>
+          </a:stretch>
+        </p:blipFill>
+        <p:spPr bwMode="auto">
+          <a:xfrm>
+            <a:off x="5220072" y="3356992"/>
+            <a:ext cx="257175" cy="228600"/>
+          </a:xfrm>
+          <a:prstGeom prst="rect">
+            <a:avLst/>
+          </a:prstGeom>
+          <a:noFill/>
+          <a:ln w="9525">
+            <a:noFill/>
+            <a:miter lim="800000"/>
+            <a:headEnd/>
+            <a:tailEnd/>
+          </a:ln>
+        </p:spPr>
+      </p:pic>
+      <p:pic>
+        <p:nvPicPr>
+          <p:cNvPr id="2052" name="Picture 4"/>
+          <p:cNvPicPr>
+            <a:picLocks noChangeAspect="1" noChangeArrowheads="1"/>
+          </p:cNvPicPr>
+          <p:nvPr/>
+        </p:nvPicPr>
+        <p:blipFill>
+          <a:blip r:embed="rId5" cstate="print"/>
+          <a:srcRect/>
+          <a:stretch>
+            <a:fillRect/>
+          </a:stretch>
+        </p:blipFill>
+        <p:spPr bwMode="auto">
+          <a:xfrm>
+            <a:off x="5436096" y="4293096"/>
+            <a:ext cx="161925" cy="104775"/>
+          </a:xfrm>
+          <a:prstGeom prst="rect">
+            <a:avLst/>
+          </a:prstGeom>
+          <a:noFill/>
+          <a:ln w="9525">
+            <a:noFill/>
+            <a:miter lim="800000"/>
+            <a:headEnd/>
+            <a:tailEnd/>
+          </a:ln>
+        </p:spPr>
+      </p:pic>
+    </p:spTree>
+  </p:cSld>
+  <p:clrMapOvr>
+    <a:masterClrMapping/>
+  </p:clrMapOvr>
+  <p:timing>
+    <p:tnLst>
+      <p:par>
+        <p:cTn id="1" dur="indefinite" restart="never" nodeType="tmRoot"/>
+      </p:par>
+    </p:tnLst>
+  </p:timing>
+</p:sld>
+</file>
+
+<file path=ppt/slides/slide11.xml><?xml version="1.0" encoding="utf-8"?>
+<p:sld xmlns:a="http://schemas.openxmlformats.org/drawingml/2006/main" xmlns:r="http://schemas.openxmlformats.org/officeDocument/2006/relationships" xmlns:p="http://schemas.openxmlformats.org/presentationml/2006/main">
+  <p:cSld>
+    <p:spTree>
+      <p:nvGrpSpPr>
+        <p:cNvPr id="1" name=""/>
+        <p:cNvGrpSpPr/>
+        <p:nvPr/>
+      </p:nvGrpSpPr>
+      <p:grpSpPr>
+        <a:xfrm>
+          <a:off x="0" y="0"/>
+          <a:ext cx="0" cy="0"/>
+          <a:chOff x="0" y="0"/>
+          <a:chExt cx="0" cy="0"/>
+        </a:xfrm>
+      </p:grpSpPr>
+      <p:sp>
+        <p:nvSpPr>
+          <p:cNvPr id="2" name="Título 1"/>
+          <p:cNvSpPr>
+            <a:spLocks noGrp="1"/>
+          </p:cNvSpPr>
+          <p:nvPr>
+            <p:ph type="title"/>
+          </p:nvPr>
+        </p:nvSpPr>
+        <p:spPr/>
+        <p:txBody>
+          <a:bodyPr/>
+          <a:lstStyle/>
+          <a:p>
+            <a:r>
+              <a:rPr lang="pt-PT" dirty="0" err="1" smtClean="0">
+                <a:solidFill>
+                  <a:srgbClr val="0070C0"/>
+                </a:solidFill>
+              </a:rPr>
+              <a:t>Particle</a:t>
+            </a:r>
+            <a:r>
+              <a:rPr lang="pt-PT" dirty="0" smtClean="0">
+                <a:solidFill>
+                  <a:srgbClr val="0070C0"/>
+                </a:solidFill>
+              </a:rPr>
+              <a:t> </a:t>
+            </a:r>
+            <a:r>
+              <a:rPr lang="pt-PT" dirty="0" err="1" smtClean="0">
+                <a:solidFill>
+                  <a:srgbClr val="0070C0"/>
+                </a:solidFill>
+              </a:rPr>
+              <a:t>Swarm</a:t>
+            </a:r>
+            <a:r>
+              <a:rPr lang="pt-PT" dirty="0" smtClean="0">
+                <a:solidFill>
+                  <a:srgbClr val="0070C0"/>
+                </a:solidFill>
+              </a:rPr>
+              <a:t> </a:t>
+            </a:r>
+            <a:r>
+              <a:rPr lang="pt-PT" dirty="0" err="1" smtClean="0">
+                <a:solidFill>
+                  <a:srgbClr val="0070C0"/>
+                </a:solidFill>
+              </a:rPr>
+              <a:t>Optimization</a:t>
+            </a:r>
+            <a:r>
+              <a:rPr lang="pt-PT" dirty="0" smtClean="0">
+                <a:solidFill>
+                  <a:srgbClr val="0070C0"/>
+                </a:solidFill>
+              </a:rPr>
+              <a:t> - exemplo</a:t>
+            </a:r>
+            <a:endParaRPr lang="pt-PT" dirty="0"/>
+          </a:p>
+        </p:txBody>
+      </p:sp>
+      <p:pic>
+        <p:nvPicPr>
+          <p:cNvPr id="4" name="Marcador de Posição de Conteúdo 3" descr="PSO3.jpg"/>
+          <p:cNvPicPr>
+            <a:picLocks noGrp="1" noChangeAspect="1"/>
+          </p:cNvPicPr>
+          <p:nvPr>
+            <p:ph sz="quarter" idx="1"/>
+          </p:nvPr>
+        </p:nvPicPr>
+        <p:blipFill>
+          <a:blip r:embed="rId2" cstate="print"/>
+          <a:stretch>
+            <a:fillRect/>
+          </a:stretch>
+        </p:blipFill>
+        <p:spPr>
+          <a:xfrm>
+            <a:off x="2286000" y="2120900"/>
+            <a:ext cx="4572000" cy="3133725"/>
+          </a:xfrm>
+        </p:spPr>
+      </p:pic>
+      <p:pic>
+        <p:nvPicPr>
+          <p:cNvPr id="3074" name="Picture 2"/>
+          <p:cNvPicPr>
+            <a:picLocks noChangeAspect="1" noChangeArrowheads="1"/>
+          </p:cNvPicPr>
+          <p:nvPr/>
+        </p:nvPicPr>
+        <p:blipFill>
+          <a:blip r:embed="rId3" cstate="print"/>
+          <a:srcRect/>
+          <a:stretch>
+            <a:fillRect/>
+          </a:stretch>
+        </p:blipFill>
+        <p:spPr bwMode="auto">
+          <a:xfrm>
+            <a:off x="4139952" y="3573016"/>
+            <a:ext cx="266700" cy="266700"/>
+          </a:xfrm>
+          <a:prstGeom prst="rect">
+            <a:avLst/>
+          </a:prstGeom>
+          <a:noFill/>
+          <a:ln w="9525">
+            <a:noFill/>
+            <a:miter lim="800000"/>
+            <a:headEnd/>
+            <a:tailEnd/>
+          </a:ln>
+        </p:spPr>
+      </p:pic>
+      <p:pic>
+        <p:nvPicPr>
+          <p:cNvPr id="3075" name="Picture 3"/>
+          <p:cNvPicPr>
+            <a:picLocks noChangeAspect="1" noChangeArrowheads="1"/>
+          </p:cNvPicPr>
+          <p:nvPr/>
+        </p:nvPicPr>
+        <p:blipFill>
+          <a:blip r:embed="rId4" cstate="print"/>
+          <a:srcRect/>
+          <a:stretch>
+            <a:fillRect/>
+          </a:stretch>
+        </p:blipFill>
+        <p:spPr bwMode="auto">
+          <a:xfrm>
+            <a:off x="6300192" y="4509120"/>
+            <a:ext cx="257175" cy="228600"/>
+          </a:xfrm>
+          <a:prstGeom prst="rect">
+            <a:avLst/>
+          </a:prstGeom>
+          <a:noFill/>
+          <a:ln w="9525">
+            <a:noFill/>
+            <a:miter lim="800000"/>
+            <a:headEnd/>
+            <a:tailEnd/>
+          </a:ln>
+        </p:spPr>
+      </p:pic>
+      <p:pic>
+        <p:nvPicPr>
+          <p:cNvPr id="3076" name="Picture 4"/>
+          <p:cNvPicPr>
+            <a:picLocks noChangeAspect="1" noChangeArrowheads="1"/>
+          </p:cNvPicPr>
+          <p:nvPr/>
+        </p:nvPicPr>
+        <p:blipFill>
+          <a:blip r:embed="rId5" cstate="print"/>
+          <a:srcRect/>
+          <a:stretch>
+            <a:fillRect/>
+          </a:stretch>
+        </p:blipFill>
+        <p:spPr bwMode="auto">
+          <a:xfrm>
+            <a:off x="5436096" y="4293096"/>
+            <a:ext cx="161925" cy="104775"/>
+          </a:xfrm>
+          <a:prstGeom prst="rect">
+            <a:avLst/>
+          </a:prstGeom>
+          <a:noFill/>
+          <a:ln w="9525">
+            <a:noFill/>
+            <a:miter lim="800000"/>
+            <a:headEnd/>
+            <a:tailEnd/>
+          </a:ln>
+        </p:spPr>
+      </p:pic>
+    </p:spTree>
+  </p:cSld>
+  <p:clrMapOvr>
+    <a:masterClrMapping/>
+  </p:clrMapOvr>
+  <p:timing>
+    <p:tnLst>
+      <p:par>
+        <p:cTn id="1" dur="indefinite" restart="never" nodeType="tmRoot"/>
+      </p:par>
+    </p:tnLst>
+  </p:timing>
+</p:sld>
+</file>
+
+<file path=ppt/slides/slide12.xml><?xml version="1.0" encoding="utf-8"?>
+<p:sld xmlns:a="http://schemas.openxmlformats.org/drawingml/2006/main" xmlns:r="http://schemas.openxmlformats.org/officeDocument/2006/relationships" xmlns:p="http://schemas.openxmlformats.org/presentationml/2006/main">
+  <p:cSld>
+    <p:spTree>
+      <p:nvGrpSpPr>
+        <p:cNvPr id="1" name=""/>
+        <p:cNvGrpSpPr/>
+        <p:nvPr/>
+      </p:nvGrpSpPr>
+      <p:grpSpPr>
+        <a:xfrm>
+          <a:off x="0" y="0"/>
+          <a:ext cx="0" cy="0"/>
+          <a:chOff x="0" y="0"/>
+          <a:chExt cx="0" cy="0"/>
+        </a:xfrm>
+      </p:grpSpPr>
+      <p:sp>
+        <p:nvSpPr>
+          <p:cNvPr id="2" name="Título 1"/>
+          <p:cNvSpPr>
+            <a:spLocks noGrp="1"/>
+          </p:cNvSpPr>
+          <p:nvPr>
+            <p:ph type="title"/>
+          </p:nvPr>
+        </p:nvSpPr>
+        <p:spPr/>
+        <p:txBody>
+          <a:bodyPr/>
+          <a:lstStyle/>
+          <a:p>
+            <a:r>
+              <a:rPr lang="pt-PT" dirty="0" err="1" smtClean="0">
+                <a:solidFill>
+                  <a:srgbClr val="0070C0"/>
+                </a:solidFill>
+              </a:rPr>
+              <a:t>Particle</a:t>
+            </a:r>
+            <a:r>
+              <a:rPr lang="pt-PT" dirty="0" smtClean="0">
+                <a:solidFill>
+                  <a:srgbClr val="0070C0"/>
+                </a:solidFill>
+              </a:rPr>
+              <a:t> </a:t>
+            </a:r>
+            <a:r>
+              <a:rPr lang="pt-PT" dirty="0" err="1" smtClean="0">
+                <a:solidFill>
+                  <a:srgbClr val="0070C0"/>
+                </a:solidFill>
+              </a:rPr>
+              <a:t>Swarm</a:t>
+            </a:r>
+            <a:r>
+              <a:rPr lang="pt-PT" dirty="0" smtClean="0">
+                <a:solidFill>
+                  <a:srgbClr val="0070C0"/>
+                </a:solidFill>
+              </a:rPr>
+              <a:t> </a:t>
+            </a:r>
+            <a:r>
+              <a:rPr lang="pt-PT" dirty="0" err="1" smtClean="0">
+                <a:solidFill>
+                  <a:srgbClr val="0070C0"/>
+                </a:solidFill>
+              </a:rPr>
+              <a:t>Optimization</a:t>
+            </a:r>
+            <a:r>
+              <a:rPr lang="pt-PT" dirty="0" smtClean="0">
+                <a:solidFill>
+                  <a:srgbClr val="0070C0"/>
+                </a:solidFill>
+              </a:rPr>
+              <a:t> - exemplo</a:t>
+            </a:r>
+            <a:endParaRPr lang="pt-PT" dirty="0"/>
+          </a:p>
+        </p:txBody>
+      </p:sp>
+      <p:pic>
+        <p:nvPicPr>
+          <p:cNvPr id="4" name="Marcador de Posição de Conteúdo 3" descr="PSO4.jpg"/>
+          <p:cNvPicPr>
+            <a:picLocks noGrp="1" noChangeAspect="1"/>
+          </p:cNvPicPr>
+          <p:nvPr>
+            <p:ph sz="quarter" idx="1"/>
+          </p:nvPr>
+        </p:nvPicPr>
+        <p:blipFill>
+          <a:blip r:embed="rId2" cstate="print"/>
+          <a:stretch>
+            <a:fillRect/>
+          </a:stretch>
+        </p:blipFill>
+        <p:spPr>
+          <a:xfrm>
+            <a:off x="2286000" y="2120900"/>
+            <a:ext cx="4572000" cy="3133725"/>
+          </a:xfrm>
+        </p:spPr>
+      </p:pic>
+      <p:pic>
+        <p:nvPicPr>
+          <p:cNvPr id="4098" name="Picture 2"/>
+          <p:cNvPicPr>
+            <a:picLocks noChangeAspect="1" noChangeArrowheads="1"/>
+          </p:cNvPicPr>
+          <p:nvPr/>
+        </p:nvPicPr>
+        <p:blipFill>
+          <a:blip r:embed="rId3" cstate="print"/>
+          <a:srcRect/>
+          <a:stretch>
+            <a:fillRect/>
+          </a:stretch>
+        </p:blipFill>
+        <p:spPr bwMode="auto">
+          <a:xfrm>
+            <a:off x="4139952" y="3573016"/>
+            <a:ext cx="266700" cy="266700"/>
+          </a:xfrm>
+          <a:prstGeom prst="rect">
+            <a:avLst/>
+          </a:prstGeom>
+          <a:noFill/>
+          <a:ln w="9525">
+            <a:noFill/>
+            <a:miter lim="800000"/>
+            <a:headEnd/>
+            <a:tailEnd/>
+          </a:ln>
+        </p:spPr>
+      </p:pic>
+      <p:pic>
+        <p:nvPicPr>
+          <p:cNvPr id="4099" name="Picture 3"/>
+          <p:cNvPicPr>
+            <a:picLocks noChangeAspect="1" noChangeArrowheads="1"/>
+          </p:cNvPicPr>
+          <p:nvPr/>
+        </p:nvPicPr>
+        <p:blipFill>
+          <a:blip r:embed="rId4" cstate="print"/>
+          <a:srcRect/>
+          <a:stretch>
+            <a:fillRect/>
+          </a:stretch>
+        </p:blipFill>
+        <p:spPr bwMode="auto">
+          <a:xfrm>
+            <a:off x="6300192" y="4509120"/>
+            <a:ext cx="257175" cy="228600"/>
+          </a:xfrm>
+          <a:prstGeom prst="rect">
+            <a:avLst/>
+          </a:prstGeom>
+          <a:noFill/>
+          <a:ln w="9525">
+            <a:noFill/>
+            <a:miter lim="800000"/>
+            <a:headEnd/>
+            <a:tailEnd/>
+          </a:ln>
+        </p:spPr>
+      </p:pic>
+      <p:pic>
+        <p:nvPicPr>
+          <p:cNvPr id="4100" name="Picture 4"/>
+          <p:cNvPicPr>
+            <a:picLocks noChangeAspect="1" noChangeArrowheads="1"/>
+          </p:cNvPicPr>
+          <p:nvPr/>
+        </p:nvPicPr>
+        <p:blipFill>
+          <a:blip r:embed="rId5" cstate="print"/>
+          <a:srcRect/>
+          <a:stretch>
+            <a:fillRect/>
+          </a:stretch>
+        </p:blipFill>
+        <p:spPr bwMode="auto">
+          <a:xfrm>
+            <a:off x="5652120" y="4581128"/>
+            <a:ext cx="161925" cy="104775"/>
+          </a:xfrm>
+          <a:prstGeom prst="rect">
+            <a:avLst/>
+          </a:prstGeom>
+          <a:noFill/>
+          <a:ln w="9525">
+            <a:noFill/>
+            <a:miter lim="800000"/>
+            <a:headEnd/>
+            <a:tailEnd/>
+          </a:ln>
+        </p:spPr>
+      </p:pic>
+    </p:spTree>
+  </p:cSld>
+  <p:clrMapOvr>
+    <a:masterClrMapping/>
+  </p:clrMapOvr>
+  <p:timing>
+    <p:tnLst>
+      <p:par>
+        <p:cTn id="1" dur="indefinite" restart="never" nodeType="tmRoot"/>
+      </p:par>
+    </p:tnLst>
+  </p:timing>
+</p:sld>
+</file>
+
+<file path=ppt/slides/slide13.xml><?xml version="1.0" encoding="utf-8"?>
+<p:sld xmlns:a="http://schemas.openxmlformats.org/drawingml/2006/main" xmlns:r="http://schemas.openxmlformats.org/officeDocument/2006/relationships" xmlns:p="http://schemas.openxmlformats.org/presentationml/2006/main">
+  <p:cSld>
+    <p:spTree>
+      <p:nvGrpSpPr>
+        <p:cNvPr id="1" name=""/>
+        <p:cNvGrpSpPr/>
+        <p:nvPr/>
+      </p:nvGrpSpPr>
+      <p:grpSpPr>
+        <a:xfrm>
+          <a:off x="0" y="0"/>
+          <a:ext cx="0" cy="0"/>
+          <a:chOff x="0" y="0"/>
+          <a:chExt cx="0" cy="0"/>
+        </a:xfrm>
+      </p:grpSpPr>
+      <p:sp>
+        <p:nvSpPr>
+          <p:cNvPr id="2" name="Título 1"/>
+          <p:cNvSpPr>
+            <a:spLocks noGrp="1"/>
+          </p:cNvSpPr>
+          <p:nvPr>
+            <p:ph type="title"/>
+          </p:nvPr>
+        </p:nvSpPr>
+        <p:spPr/>
+        <p:txBody>
+          <a:bodyPr/>
+          <a:lstStyle/>
+          <a:p>
+            <a:r>
+              <a:rPr lang="pt-PT" dirty="0" err="1" smtClean="0">
+                <a:solidFill>
+                  <a:srgbClr val="0070C0"/>
+                </a:solidFill>
+              </a:rPr>
+              <a:t>Particle</a:t>
+            </a:r>
+            <a:r>
+              <a:rPr lang="pt-PT" dirty="0" smtClean="0">
+                <a:solidFill>
+                  <a:srgbClr val="0070C0"/>
+                </a:solidFill>
+              </a:rPr>
+              <a:t> </a:t>
+            </a:r>
+            <a:r>
+              <a:rPr lang="pt-PT" dirty="0" err="1" smtClean="0">
+                <a:solidFill>
+                  <a:srgbClr val="0070C0"/>
+                </a:solidFill>
+              </a:rPr>
+              <a:t>Swarm</a:t>
+            </a:r>
+            <a:r>
+              <a:rPr lang="pt-PT" dirty="0" smtClean="0">
+                <a:solidFill>
+                  <a:srgbClr val="0070C0"/>
+                </a:solidFill>
+              </a:rPr>
+              <a:t> </a:t>
+            </a:r>
+            <a:r>
+              <a:rPr lang="pt-PT" dirty="0" err="1" smtClean="0">
+                <a:solidFill>
+                  <a:srgbClr val="0070C0"/>
+                </a:solidFill>
+              </a:rPr>
+              <a:t>Optimization</a:t>
+            </a:r>
+            <a:r>
+              <a:rPr lang="pt-PT" dirty="0" smtClean="0">
+                <a:solidFill>
+                  <a:srgbClr val="0070C0"/>
+                </a:solidFill>
+              </a:rPr>
+              <a:t> - exemplo</a:t>
+            </a:r>
+            <a:endParaRPr lang="pt-PT" dirty="0"/>
+          </a:p>
+        </p:txBody>
+      </p:sp>
+      <p:pic>
+        <p:nvPicPr>
+          <p:cNvPr id="4" name="Marcador de Posição de Conteúdo 3" descr="PSO5.jpg"/>
+          <p:cNvPicPr>
+            <a:picLocks noGrp="1" noChangeAspect="1"/>
+          </p:cNvPicPr>
+          <p:nvPr>
+            <p:ph sz="quarter" idx="1"/>
+          </p:nvPr>
+        </p:nvPicPr>
+        <p:blipFill>
+          <a:blip r:embed="rId2" cstate="print"/>
+          <a:stretch>
+            <a:fillRect/>
+          </a:stretch>
+        </p:blipFill>
+        <p:spPr>
+          <a:xfrm>
+            <a:off x="2286000" y="2120900"/>
+            <a:ext cx="4572000" cy="3133725"/>
+          </a:xfrm>
+        </p:spPr>
+      </p:pic>
+      <p:pic>
+        <p:nvPicPr>
+          <p:cNvPr id="5123" name="Picture 3"/>
+          <p:cNvPicPr>
+            <a:picLocks noChangeAspect="1" noChangeArrowheads="1"/>
+          </p:cNvPicPr>
+          <p:nvPr/>
+        </p:nvPicPr>
+        <p:blipFill>
+          <a:blip r:embed="rId3" cstate="print"/>
+          <a:srcRect/>
+          <a:stretch>
+            <a:fillRect/>
+          </a:stretch>
+        </p:blipFill>
+        <p:spPr bwMode="auto">
+          <a:xfrm>
+            <a:off x="6300192" y="4509120"/>
+            <a:ext cx="257175" cy="228600"/>
+          </a:xfrm>
+          <a:prstGeom prst="rect">
+            <a:avLst/>
+          </a:prstGeom>
+          <a:noFill/>
+          <a:ln w="9525">
+            <a:noFill/>
+            <a:miter lim="800000"/>
+            <a:headEnd/>
+            <a:tailEnd/>
+          </a:ln>
+        </p:spPr>
+      </p:pic>
+      <p:pic>
+        <p:nvPicPr>
+          <p:cNvPr id="5122" name="Picture 2"/>
+          <p:cNvPicPr>
+            <a:picLocks noChangeAspect="1" noChangeArrowheads="1"/>
+          </p:cNvPicPr>
+          <p:nvPr/>
+        </p:nvPicPr>
+        <p:blipFill>
+          <a:blip r:embed="rId4" cstate="print"/>
+          <a:srcRect/>
+          <a:stretch>
+            <a:fillRect/>
+          </a:stretch>
+        </p:blipFill>
+        <p:spPr bwMode="auto">
+          <a:xfrm>
+            <a:off x="4067944" y="3573016"/>
+            <a:ext cx="266700" cy="266700"/>
+          </a:xfrm>
+          <a:prstGeom prst="rect">
+            <a:avLst/>
+          </a:prstGeom>
+          <a:noFill/>
+          <a:ln w="9525">
+            <a:noFill/>
+            <a:miter lim="800000"/>
+            <a:headEnd/>
+            <a:tailEnd/>
+          </a:ln>
+        </p:spPr>
+      </p:pic>
+      <p:pic>
+        <p:nvPicPr>
+          <p:cNvPr id="5124" name="Picture 4"/>
+          <p:cNvPicPr>
+            <a:picLocks noChangeAspect="1" noChangeArrowheads="1"/>
+          </p:cNvPicPr>
+          <p:nvPr/>
+        </p:nvPicPr>
+        <p:blipFill>
+          <a:blip r:embed="rId5" cstate="print"/>
+          <a:srcRect/>
+          <a:stretch>
+            <a:fillRect/>
+          </a:stretch>
+        </p:blipFill>
+        <p:spPr bwMode="auto">
+          <a:xfrm>
+            <a:off x="5868144" y="4437112"/>
+            <a:ext cx="161925" cy="104775"/>
+          </a:xfrm>
+          <a:prstGeom prst="rect">
+            <a:avLst/>
+          </a:prstGeom>
+          <a:noFill/>
+          <a:ln w="9525">
+            <a:noFill/>
+            <a:miter lim="800000"/>
+            <a:headEnd/>
+            <a:tailEnd/>
+          </a:ln>
+        </p:spPr>
+      </p:pic>
+    </p:spTree>
+  </p:cSld>
+  <p:clrMapOvr>
+    <a:masterClrMapping/>
+  </p:clrMapOvr>
+  <p:timing>
+    <p:tnLst>
+      <p:par>
+        <p:cTn id="1" dur="indefinite" restart="never" nodeType="tmRoot"/>
+      </p:par>
+    </p:tnLst>
+  </p:timing>
+</p:sld>
+</file>
+
+<file path=ppt/slides/slide14.xml><?xml version="1.0" encoding="utf-8"?>
+<p:sld xmlns:a="http://schemas.openxmlformats.org/drawingml/2006/main" xmlns:r="http://schemas.openxmlformats.org/officeDocument/2006/relationships" xmlns:p="http://schemas.openxmlformats.org/presentationml/2006/main">
+  <p:cSld>
+    <p:spTree>
+      <p:nvGrpSpPr>
+        <p:cNvPr id="1" name=""/>
+        <p:cNvGrpSpPr/>
+        <p:nvPr/>
+      </p:nvGrpSpPr>
+      <p:grpSpPr>
+        <a:xfrm>
+          <a:off x="0" y="0"/>
+          <a:ext cx="0" cy="0"/>
+          <a:chOff x="0" y="0"/>
+          <a:chExt cx="0" cy="0"/>
+        </a:xfrm>
+      </p:grpSpPr>
+      <p:sp>
+        <p:nvSpPr>
+          <p:cNvPr id="2" name="Título 1"/>
+          <p:cNvSpPr>
+            <a:spLocks noGrp="1"/>
+          </p:cNvSpPr>
+          <p:nvPr>
+            <p:ph type="title"/>
+          </p:nvPr>
+        </p:nvSpPr>
+        <p:spPr/>
+        <p:txBody>
+          <a:bodyPr/>
+          <a:lstStyle/>
+          <a:p>
+            <a:r>
+              <a:rPr lang="pt-PT" dirty="0" err="1" smtClean="0">
+                <a:solidFill>
+                  <a:srgbClr val="0070C0"/>
+                </a:solidFill>
+              </a:rPr>
+              <a:t>Particle</a:t>
+            </a:r>
+            <a:r>
+              <a:rPr lang="pt-PT" dirty="0" smtClean="0">
+                <a:solidFill>
+                  <a:srgbClr val="0070C0"/>
+                </a:solidFill>
+              </a:rPr>
+              <a:t> </a:t>
+            </a:r>
+            <a:r>
+              <a:rPr lang="pt-PT" dirty="0" err="1" smtClean="0">
+                <a:solidFill>
+                  <a:srgbClr val="0070C0"/>
+                </a:solidFill>
+              </a:rPr>
+              <a:t>Swarm</a:t>
+            </a:r>
+            <a:r>
+              <a:rPr lang="pt-PT" dirty="0" smtClean="0">
+                <a:solidFill>
+                  <a:srgbClr val="0070C0"/>
+                </a:solidFill>
+              </a:rPr>
+              <a:t> </a:t>
+            </a:r>
+            <a:r>
+              <a:rPr lang="pt-PT" dirty="0" err="1" smtClean="0">
+                <a:solidFill>
+                  <a:srgbClr val="0070C0"/>
+                </a:solidFill>
+              </a:rPr>
+              <a:t>Optimization</a:t>
+            </a:r>
+            <a:r>
+              <a:rPr lang="pt-PT" dirty="0" smtClean="0">
+                <a:solidFill>
+                  <a:srgbClr val="0070C0"/>
+                </a:solidFill>
+              </a:rPr>
+              <a:t> - exemplo</a:t>
+            </a:r>
+            <a:endParaRPr lang="pt-PT" dirty="0"/>
+          </a:p>
+        </p:txBody>
+      </p:sp>
+      <p:pic>
+        <p:nvPicPr>
+          <p:cNvPr id="4" name="Marcador de Posição de Conteúdo 3" descr="PSO6.jpg"/>
+          <p:cNvPicPr>
+            <a:picLocks noGrp="1" noChangeAspect="1"/>
+          </p:cNvPicPr>
+          <p:nvPr>
+            <p:ph sz="quarter" idx="1"/>
+          </p:nvPr>
+        </p:nvPicPr>
+        <p:blipFill>
+          <a:blip r:embed="rId2" cstate="print"/>
+          <a:stretch>
+            <a:fillRect/>
+          </a:stretch>
+        </p:blipFill>
+        <p:spPr>
+          <a:xfrm>
+            <a:off x="2286000" y="2095475"/>
+            <a:ext cx="4572000" cy="3133725"/>
+          </a:xfrm>
+        </p:spPr>
+      </p:pic>
+      <p:pic>
+        <p:nvPicPr>
+          <p:cNvPr id="6146" name="Picture 2"/>
+          <p:cNvPicPr>
+            <a:picLocks noChangeAspect="1" noChangeArrowheads="1"/>
+          </p:cNvPicPr>
+          <p:nvPr/>
+        </p:nvPicPr>
+        <p:blipFill>
+          <a:blip r:embed="rId3" cstate="print"/>
+          <a:srcRect/>
+          <a:stretch>
+            <a:fillRect/>
+          </a:stretch>
+        </p:blipFill>
+        <p:spPr bwMode="auto">
+          <a:xfrm>
+            <a:off x="4139952" y="3501008"/>
+            <a:ext cx="266700" cy="266700"/>
+          </a:xfrm>
+          <a:prstGeom prst="rect">
+            <a:avLst/>
+          </a:prstGeom>
+          <a:noFill/>
+          <a:ln w="9525">
+            <a:noFill/>
+            <a:miter lim="800000"/>
+            <a:headEnd/>
+            <a:tailEnd/>
+          </a:ln>
+        </p:spPr>
+      </p:pic>
+      <p:pic>
+        <p:nvPicPr>
+          <p:cNvPr id="6147" name="Picture 3"/>
+          <p:cNvPicPr>
+            <a:picLocks noChangeAspect="1" noChangeArrowheads="1"/>
+          </p:cNvPicPr>
+          <p:nvPr/>
+        </p:nvPicPr>
+        <p:blipFill>
+          <a:blip r:embed="rId4" cstate="print"/>
+          <a:srcRect/>
+          <a:stretch>
+            <a:fillRect/>
+          </a:stretch>
+        </p:blipFill>
+        <p:spPr bwMode="auto">
+          <a:xfrm>
+            <a:off x="6228184" y="4581128"/>
+            <a:ext cx="257175" cy="228600"/>
+          </a:xfrm>
+          <a:prstGeom prst="rect">
+            <a:avLst/>
+          </a:prstGeom>
+          <a:noFill/>
+          <a:ln w="9525">
+            <a:noFill/>
+            <a:miter lim="800000"/>
+            <a:headEnd/>
+            <a:tailEnd/>
+          </a:ln>
+        </p:spPr>
+      </p:pic>
+      <p:pic>
+        <p:nvPicPr>
+          <p:cNvPr id="6148" name="Picture 4"/>
+          <p:cNvPicPr>
+            <a:picLocks noChangeAspect="1" noChangeArrowheads="1"/>
+          </p:cNvPicPr>
+          <p:nvPr/>
+        </p:nvPicPr>
+        <p:blipFill>
+          <a:blip r:embed="rId5" cstate="print"/>
+          <a:srcRect/>
+          <a:stretch>
+            <a:fillRect/>
+          </a:stretch>
+        </p:blipFill>
+        <p:spPr bwMode="auto">
+          <a:xfrm>
+            <a:off x="5868144" y="4437112"/>
+            <a:ext cx="161925" cy="104775"/>
+          </a:xfrm>
+          <a:prstGeom prst="rect">
+            <a:avLst/>
+          </a:prstGeom>
+          <a:noFill/>
+          <a:ln w="9525">
+            <a:noFill/>
+            <a:miter lim="800000"/>
+            <a:headEnd/>
+            <a:tailEnd/>
+          </a:ln>
+        </p:spPr>
+      </p:pic>
+    </p:spTree>
+  </p:cSld>
+  <p:clrMapOvr>
+    <a:masterClrMapping/>
+  </p:clrMapOvr>
+  <p:timing>
+    <p:tnLst>
+      <p:par>
+        <p:cTn id="1" dur="indefinite" restart="never" nodeType="tmRoot"/>
+      </p:par>
+    </p:tnLst>
+  </p:timing>
+</p:sld>
+</file>
+
+<file path=ppt/slides/slide15.xml><?xml version="1.0" encoding="utf-8"?>
+<p:sld xmlns:a="http://schemas.openxmlformats.org/drawingml/2006/main" xmlns:r="http://schemas.openxmlformats.org/officeDocument/2006/relationships" xmlns:p="http://schemas.openxmlformats.org/presentationml/2006/main">
+  <p:cSld>
+    <p:spTree>
+      <p:nvGrpSpPr>
+        <p:cNvPr id="1" name=""/>
+        <p:cNvGrpSpPr/>
+        <p:nvPr/>
+      </p:nvGrpSpPr>
+      <p:grpSpPr>
+        <a:xfrm>
+          <a:off x="0" y="0"/>
+          <a:ext cx="0" cy="0"/>
+          <a:chOff x="0" y="0"/>
+          <a:chExt cx="0" cy="0"/>
+        </a:xfrm>
+      </p:grpSpPr>
+      <p:sp>
+        <p:nvSpPr>
+          <p:cNvPr id="2" name="Título 1"/>
+          <p:cNvSpPr>
+            <a:spLocks noGrp="1"/>
+          </p:cNvSpPr>
+          <p:nvPr>
+            <p:ph type="title"/>
+          </p:nvPr>
+        </p:nvSpPr>
+        <p:spPr/>
+        <p:txBody>
+          <a:bodyPr/>
+          <a:lstStyle/>
+          <a:p>
+            <a:r>
+              <a:rPr lang="pt-PT" dirty="0" err="1" smtClean="0">
+                <a:solidFill>
+                  <a:srgbClr val="0070C0"/>
+                </a:solidFill>
+              </a:rPr>
+              <a:t>Particle</a:t>
+            </a:r>
+            <a:r>
+              <a:rPr lang="pt-PT" dirty="0" smtClean="0">
+                <a:solidFill>
+                  <a:srgbClr val="0070C0"/>
+                </a:solidFill>
+              </a:rPr>
+              <a:t> </a:t>
+            </a:r>
+            <a:r>
+              <a:rPr lang="pt-PT" dirty="0" err="1" smtClean="0">
+                <a:solidFill>
+                  <a:srgbClr val="0070C0"/>
+                </a:solidFill>
+              </a:rPr>
+              <a:t>Swarm</a:t>
+            </a:r>
+            <a:r>
+              <a:rPr lang="pt-PT" dirty="0" smtClean="0">
+                <a:solidFill>
+                  <a:srgbClr val="0070C0"/>
+                </a:solidFill>
+              </a:rPr>
+              <a:t> </a:t>
+            </a:r>
+            <a:r>
+              <a:rPr lang="pt-PT" dirty="0" err="1" smtClean="0">
+                <a:solidFill>
+                  <a:srgbClr val="0070C0"/>
+                </a:solidFill>
+              </a:rPr>
+              <a:t>Optimization</a:t>
+            </a:r>
+            <a:endParaRPr lang="pt-PT" dirty="0"/>
+          </a:p>
+        </p:txBody>
+      </p:sp>
+      <p:sp>
+        <p:nvSpPr>
+          <p:cNvPr id="3" name="Marcador de Posição de Conteúdo 2"/>
+          <p:cNvSpPr>
+            <a:spLocks noGrp="1"/>
+          </p:cNvSpPr>
+          <p:nvPr>
+            <p:ph sz="quarter" idx="1"/>
+          </p:nvPr>
+        </p:nvSpPr>
+        <p:spPr/>
+        <p:txBody>
+          <a:bodyPr/>
+          <a:lstStyle/>
+          <a:p>
+            <a:r>
+              <a:rPr lang="pt-PT" dirty="0" smtClean="0"/>
+              <a:t>Exemplos:</a:t>
+            </a:r>
+          </a:p>
+          <a:p>
+            <a:endParaRPr lang="pt-PT" dirty="0" smtClean="0">
+              <a:hlinkClick r:id="rId2"/>
+            </a:endParaRPr>
+          </a:p>
+          <a:p>
+            <a:r>
+              <a:rPr lang="pt-PT" dirty="0" smtClean="0">
+                <a:hlinkClick r:id="rId2"/>
+              </a:rPr>
+              <a:t>http://www.youtube.com/watch?v=3LdgzUIwvXU</a:t>
+            </a:r>
+            <a:endParaRPr lang="pt-PT" dirty="0" smtClean="0"/>
+          </a:p>
+          <a:p>
+            <a:endParaRPr lang="pt-PT" dirty="0" smtClean="0">
+              <a:hlinkClick r:id="rId3"/>
+            </a:endParaRPr>
+          </a:p>
+          <a:p>
+            <a:r>
+              <a:rPr lang="pt-PT" dirty="0" smtClean="0">
+                <a:hlinkClick r:id="rId3"/>
+              </a:rPr>
+              <a:t>http://www.youtube.com/watch?v=gE9xfe4MVeo</a:t>
+            </a:r>
+            <a:endParaRPr lang="pt-PT" dirty="0" smtClean="0"/>
+          </a:p>
+          <a:p>
+            <a:endParaRPr lang="pt-PT" dirty="0" smtClean="0"/>
+          </a:p>
+          <a:p>
+            <a:r>
+              <a:rPr lang="pt-PT" dirty="0" smtClean="0">
+                <a:hlinkClick r:id="rId4"/>
+              </a:rPr>
+              <a:t>http://www.youtube.com/watch?v=ML2vuzqw1ok&amp;feature=related</a:t>
+            </a:r>
+            <a:endParaRPr lang="pt-PT" dirty="0" smtClean="0"/>
+          </a:p>
+          <a:p>
+            <a:endParaRPr lang="pt-PT" dirty="0" smtClean="0"/>
+          </a:p>
+          <a:p>
+            <a:r>
+              <a:rPr lang="pt-PT" smtClean="0">
+                <a:hlinkClick r:id="rId5"/>
+              </a:rPr>
+              <a:t>http://www.youtube.com/watch?v=_bzRHqmpwvo</a:t>
+            </a:r>
+            <a:endParaRPr lang="pt-PT" smtClean="0"/>
+          </a:p>
+          <a:p>
+            <a:endParaRPr lang="pt-PT" dirty="0" smtClean="0"/>
+          </a:p>
+          <a:p>
+            <a:endParaRPr lang="pt-PT" dirty="0" smtClean="0"/>
+          </a:p>
+        </p:txBody>
+      </p:sp>
+    </p:spTree>
+  </p:cSld>
+  <p:clrMapOvr>
+    <a:masterClrMapping/>
+  </p:clrMapOvr>
+  <p:timing>
+    <p:tnLst>
+      <p:par>
+        <p:cTn id="1" dur="indefinite" restart="never" nodeType="tmRoot"/>
+      </p:par>
+    </p:tnLst>
+  </p:timing>
+</p:sld>
+</file>
+
 <file path=ppt/slides/slide2.xml><?xml version="1.0" encoding="utf-8"?>
 <p:sld xmlns:a="http://schemas.openxmlformats.org/drawingml/2006/main" xmlns:r="http://schemas.openxmlformats.org/officeDocument/2006/relationships" xmlns:p="http://schemas.openxmlformats.org/presentationml/2006/main">
   <p:cSld>
@@ -4002,7 +5293,6 @@
               <a:rPr lang="pt-PT" dirty="0" smtClean="0"/>
               <a:t>Optimização de enxame de partículas é a optimização semelhante aos algoritmos genéticos, inspirada no comportamento social das aves ou dos cardumes de peixes.</a:t>
             </a:r>
-            <a:endParaRPr lang="pt-PT" dirty="0" smtClean="0"/>
           </a:p>
           <a:p>
             <a:r>
@@ -4472,15 +5762,7 @@
           <a:p>
             <a:r>
               <a:rPr lang="pt-PT" dirty="0" smtClean="0"/>
-              <a:t>O conceito de otimização de enxame de partícula </a:t>
-            </a:r>
-            <a:r>
-              <a:rPr lang="pt-PT" dirty="0" smtClean="0"/>
-              <a:t>consiste </a:t>
-            </a:r>
-            <a:r>
-              <a:rPr lang="pt-PT" dirty="0" smtClean="0"/>
-              <a:t>em ir alterando a velocidade da partícula (aceleração), a cada momento que passa, em direção aos seus locais de </a:t>
+              <a:t>O conceito de otimização de enxame de partícula consiste em ir alterando a velocidade da partícula (aceleração), a cada momento que passa, em direção aos seus locais de </a:t>
             </a:r>
             <a:r>
               <a:rPr lang="pt-PT" dirty="0" err="1" smtClean="0"/>
@@ -4496,15 +5778,7 @@
             </a:r>
             <a:r>
               <a:rPr lang="pt-PT" dirty="0" smtClean="0"/>
-              <a:t> (versão local da PSO). A aceleração é ponderada por um termo aleatório, com números aleatórios separados, sendo gerados para </a:t>
-            </a:r>
-            <a:r>
-              <a:rPr lang="pt-PT" dirty="0" smtClean="0"/>
-              <a:t>haver aceleração </a:t>
-            </a:r>
-            <a:r>
-              <a:rPr lang="pt-PT" dirty="0" smtClean="0"/>
-              <a:t>em direção a locais de </a:t>
+              <a:t> (versão local da PSO). A aceleração é ponderada por um termo aleatório, com números aleatórios separados, sendo gerados para haver aceleração em direção a locais de </a:t>
             </a:r>
             <a:r>
               <a:rPr lang="pt-PT" dirty="0" err="1" smtClean="0"/>
@@ -4774,15 +6048,7 @@
           <a:p>
             <a:r>
               <a:rPr lang="pt-PT" dirty="0" smtClean="0"/>
-              <a:t>v -velocidade </a:t>
-            </a:r>
-            <a:r>
-              <a:rPr lang="pt-PT" dirty="0" smtClean="0"/>
-              <a:t>da </a:t>
-            </a:r>
-            <a:r>
-              <a:rPr lang="pt-PT" dirty="0" smtClean="0"/>
-              <a:t>partícula; </a:t>
+              <a:t>v -velocidade da partícula; </a:t>
             </a:r>
           </a:p>
           <a:p>
@@ -4794,27 +6060,17 @@
               <a:rPr lang="pt-PT" dirty="0" smtClean="0"/>
               <a:t>-partícula atual. </a:t>
             </a:r>
-            <a:endParaRPr lang="pt-PT" dirty="0" smtClean="0"/>
           </a:p>
           <a:p>
             <a:r>
               <a:rPr lang="pt-PT" dirty="0" smtClean="0"/>
-              <a:t>rand</a:t>
-            </a:r>
+              <a:t>rand() é um número aleatório entre (0,1). </a:t>
+            </a:r>
+          </a:p>
+          <a:p>
             <a:r>
               <a:rPr lang="pt-PT" dirty="0" smtClean="0"/>
-              <a:t>() é um número aleatório entre (0,1). </a:t>
-            </a:r>
-            <a:endParaRPr lang="pt-PT" dirty="0" smtClean="0"/>
-          </a:p>
-          <a:p>
-            <a:r>
-              <a:rPr lang="pt-PT" dirty="0" smtClean="0"/>
-              <a:t>C1 </a:t>
-            </a:r>
-            <a:r>
-              <a:rPr lang="pt-PT" dirty="0" smtClean="0"/>
-              <a:t>e c2 são fatores de aprendizagem. Geralmente c1 = c2 = 2.</a:t>
+              <a:t>C1 e c2 são fatores de aprendizagem. Geralmente c1 = c2 = 2.</a:t>
             </a:r>
           </a:p>
           <a:p>
@@ -5032,6 +6288,13 @@
   <p:clrMapOvr>
     <a:masterClrMapping/>
   </p:clrMapOvr>
+  <p:timing>
+    <p:tnLst>
+      <p:par>
+        <p:cTn id="1" dur="indefinite" restart="never" nodeType="tmRoot"/>
+      </p:par>
+    </p:tnLst>
+  </p:timing>
 </p:sld>
 </file>
 
@@ -5107,105 +6370,137 @@
               </a:rPr>
               <a:t>Optimization</a:t>
             </a:r>
+            <a:r>
+              <a:rPr lang="pt-PT" dirty="0" smtClean="0">
+                <a:solidFill>
+                  <a:srgbClr val="0070C0"/>
+                </a:solidFill>
+              </a:rPr>
+              <a:t> - exemplo</a:t>
+            </a:r>
             <a:endParaRPr lang="pt-PT" dirty="0"/>
           </a:p>
         </p:txBody>
       </p:sp>
-      <p:sp>
-        <p:nvSpPr>
-          <p:cNvPr id="3" name="Marcador de Posição de Conteúdo 2"/>
-          <p:cNvSpPr>
-            <a:spLocks noGrp="1"/>
-          </p:cNvSpPr>
+      <p:pic>
+        <p:nvPicPr>
+          <p:cNvPr id="5" name="Marcador de Posição de Conteúdo 4" descr="PSO1.jpg"/>
+          <p:cNvPicPr>
+            <a:picLocks noGrp="1" noChangeAspect="1"/>
+          </p:cNvPicPr>
           <p:nvPr>
             <p:ph sz="quarter" idx="1"/>
           </p:nvPr>
-        </p:nvSpPr>
-        <p:spPr/>
-        <p:txBody>
-          <a:bodyPr/>
-          <a:lstStyle/>
-          <a:p>
-            <a:r>
-              <a:rPr lang="pt-PT" dirty="0" smtClean="0"/>
-              <a:t>Exemplos:</a:t>
-            </a:r>
-          </a:p>
-          <a:p>
-            <a:endParaRPr lang="pt-PT" dirty="0" smtClean="0">
-              <a:hlinkClick r:id="rId2"/>
-            </a:endParaRPr>
-          </a:p>
-          <a:p>
-            <a:r>
-              <a:rPr lang="pt-PT" dirty="0" smtClean="0">
-                <a:hlinkClick r:id="rId2"/>
-              </a:rPr>
-              <a:t>http</a:t>
-            </a:r>
-            <a:r>
-              <a:rPr lang="pt-PT" dirty="0" smtClean="0">
-                <a:hlinkClick r:id="rId2"/>
-              </a:rPr>
-              <a:t>://</a:t>
-            </a:r>
-            <a:r>
-              <a:rPr lang="pt-PT" dirty="0" smtClean="0">
-                <a:hlinkClick r:id="rId2"/>
-              </a:rPr>
-              <a:t>www.youtube.com/watch?v=3LdgzUIwvXU</a:t>
-            </a:r>
-            <a:endParaRPr lang="pt-PT" dirty="0" smtClean="0"/>
-          </a:p>
-          <a:p>
-            <a:endParaRPr lang="pt-PT" dirty="0" smtClean="0">
-              <a:hlinkClick r:id="rId3"/>
-            </a:endParaRPr>
-          </a:p>
-          <a:p>
-            <a:r>
-              <a:rPr lang="pt-PT" dirty="0" smtClean="0">
-                <a:hlinkClick r:id="rId3"/>
-              </a:rPr>
-              <a:t>http</a:t>
-            </a:r>
-            <a:r>
-              <a:rPr lang="pt-PT" dirty="0" smtClean="0">
-                <a:hlinkClick r:id="rId3"/>
-              </a:rPr>
-              <a:t>://</a:t>
-            </a:r>
-            <a:r>
-              <a:rPr lang="pt-PT" dirty="0" smtClean="0">
-                <a:hlinkClick r:id="rId3"/>
-              </a:rPr>
-              <a:t>www.youtube.com/watch?v=gE9xfe4MVeo</a:t>
-            </a:r>
-            <a:endParaRPr lang="pt-PT" dirty="0" smtClean="0"/>
-          </a:p>
-          <a:p>
-            <a:endParaRPr lang="pt-PT" dirty="0" smtClean="0"/>
-          </a:p>
-          <a:p>
-            <a:r>
-              <a:rPr lang="pt-PT" dirty="0" smtClean="0">
-                <a:hlinkClick r:id="rId4"/>
-              </a:rPr>
-              <a:t>http://</a:t>
-            </a:r>
-            <a:r>
-              <a:rPr lang="pt-PT" dirty="0" smtClean="0">
-                <a:hlinkClick r:id="rId4"/>
-              </a:rPr>
-              <a:t>www.youtube.com/watch?v=ML2vuzqw1ok&amp;feature=related</a:t>
-            </a:r>
-            <a:endParaRPr lang="pt-PT" dirty="0" smtClean="0"/>
-          </a:p>
-          <a:p>
-            <a:endParaRPr lang="pt-PT" dirty="0" smtClean="0"/>
-          </a:p>
-        </p:txBody>
-      </p:sp>
+        </p:nvPicPr>
+        <p:blipFill>
+          <a:blip r:embed="rId2" cstate="print"/>
+          <a:stretch>
+            <a:fillRect/>
+          </a:stretch>
+        </p:blipFill>
+        <p:spPr>
+          <a:xfrm>
+            <a:off x="2286000" y="2120900"/>
+            <a:ext cx="4572000" cy="3133725"/>
+          </a:xfrm>
+        </p:spPr>
+      </p:pic>
+      <p:pic>
+        <p:nvPicPr>
+          <p:cNvPr id="1027" name="Picture 3"/>
+          <p:cNvPicPr>
+            <a:picLocks noChangeAspect="1" noChangeArrowheads="1"/>
+          </p:cNvPicPr>
+          <p:nvPr/>
+        </p:nvPicPr>
+        <p:blipFill>
+          <a:blip r:embed="rId3" cstate="print"/>
+          <a:srcRect/>
+          <a:stretch>
+            <a:fillRect/>
+          </a:stretch>
+        </p:blipFill>
+        <p:spPr bwMode="auto">
+          <a:xfrm>
+            <a:off x="3275856" y="2420888"/>
+            <a:ext cx="266700" cy="266700"/>
+          </a:xfrm>
+          <a:prstGeom prst="rect">
+            <a:avLst/>
+          </a:prstGeom>
+          <a:noFill/>
+          <a:ln w="9525">
+            <a:noFill/>
+            <a:miter lim="800000"/>
+            <a:headEnd/>
+            <a:tailEnd/>
+          </a:ln>
+        </p:spPr>
+      </p:pic>
+      <p:pic>
+        <p:nvPicPr>
+          <p:cNvPr id="1029" name="Picture 5"/>
+          <p:cNvPicPr>
+            <a:picLocks noChangeAspect="1" noChangeArrowheads="1"/>
+          </p:cNvPicPr>
+          <p:nvPr/>
+        </p:nvPicPr>
+        <p:blipFill>
+          <a:blip r:embed="rId4" cstate="print"/>
+          <a:srcRect/>
+          <a:stretch>
+            <a:fillRect/>
+          </a:stretch>
+        </p:blipFill>
+        <p:spPr bwMode="auto">
+          <a:xfrm>
+            <a:off x="3779912" y="3212976"/>
+            <a:ext cx="257175" cy="228600"/>
+          </a:xfrm>
+          <a:prstGeom prst="rect">
+            <a:avLst/>
+          </a:prstGeom>
+          <a:noFill/>
+          <a:ln w="9525">
+            <a:noFill/>
+            <a:miter lim="800000"/>
+            <a:headEnd/>
+            <a:tailEnd/>
+          </a:ln>
+        </p:spPr>
+      </p:pic>
+      <p:pic>
+        <p:nvPicPr>
+          <p:cNvPr id="1030" name="Picture 6"/>
+          <p:cNvPicPr>
+            <a:picLocks noChangeAspect="1" noChangeArrowheads="1"/>
+          </p:cNvPicPr>
+          <p:nvPr/>
+        </p:nvPicPr>
+        <p:blipFill>
+          <a:blip r:embed="rId5" cstate="print"/>
+          <a:srcRect/>
+          <a:stretch>
+            <a:fillRect/>
+          </a:stretch>
+        </p:blipFill>
+        <p:spPr bwMode="auto">
+          <a:xfrm>
+            <a:off x="5436096" y="4293096"/>
+            <a:ext cx="161925" cy="104775"/>
+          </a:xfrm>
+          <a:prstGeom prst="rect">
+            <a:avLst/>
+          </a:prstGeom>
+          <a:noFill/>
+          <a:ln w="9525">
+            <a:noFill/>
+            <a:miter lim="800000"/>
+            <a:headEnd/>
+            <a:tailEnd/>
+          </a:ln>
+        </p:spPr>
+      </p:pic>
     </p:spTree>
   </p:cSld>
   <p:clrMapOvr>

</xml_diff>